<commit_message>
Slight updates to Getting Started ppt
</commit_message>
<xml_diff>
--- a/PPTs/Getting Started With F.pptx
+++ b/PPTs/Getting Started With F.pptx
@@ -319,7 +319,7 @@
             <a:fld id="{96DFF08F-DC6B-4601-B491-B0F83F6DD2DA}" type="datetimeFigureOut">
               <a:rPr lang="en-US" smtClean="0"/>
               <a:pPr/>
-              <a:t>3/7/2013</a:t>
+              <a:t>4/6/2013</a:t>
             </a:fld>
             <a:endParaRPr lang="en-US" dirty="0"/>
           </a:p>
@@ -524,7 +524,7 @@
           <a:p>
             <a:fld id="{96DFF08F-DC6B-4601-B491-B0F83F6DD2DA}" type="datetimeFigureOut">
               <a:rPr lang="en-US" smtClean="0"/>
-              <a:t>3/7/2013</a:t>
+              <a:t>4/6/2013</a:t>
             </a:fld>
             <a:endParaRPr lang="en-US"/>
           </a:p>
@@ -704,7 +704,7 @@
           <a:p>
             <a:fld id="{96DFF08F-DC6B-4601-B491-B0F83F6DD2DA}" type="datetimeFigureOut">
               <a:rPr lang="en-US" smtClean="0"/>
-              <a:t>3/7/2013</a:t>
+              <a:t>4/6/2013</a:t>
             </a:fld>
             <a:endParaRPr lang="en-US"/>
           </a:p>
@@ -909,7 +909,7 @@
           <a:p>
             <a:fld id="{96DFF08F-DC6B-4601-B491-B0F83F6DD2DA}" type="datetimeFigureOut">
               <a:rPr lang="en-US" smtClean="0"/>
-              <a:t>3/7/2013</a:t>
+              <a:t>4/6/2013</a:t>
             </a:fld>
             <a:endParaRPr lang="en-US"/>
           </a:p>
@@ -1222,7 +1222,7 @@
           <a:p>
             <a:fld id="{96DFF08F-DC6B-4601-B491-B0F83F6DD2DA}" type="datetimeFigureOut">
               <a:rPr lang="en-US" smtClean="0"/>
-              <a:t>3/7/2013</a:t>
+              <a:t>4/6/2013</a:t>
             </a:fld>
             <a:endParaRPr lang="en-US"/>
           </a:p>
@@ -1489,7 +1489,7 @@
           <a:p>
             <a:fld id="{96DFF08F-DC6B-4601-B491-B0F83F6DD2DA}" type="datetimeFigureOut">
               <a:rPr lang="en-US" smtClean="0"/>
-              <a:t>3/7/2013</a:t>
+              <a:t>4/6/2013</a:t>
             </a:fld>
             <a:endParaRPr lang="en-US"/>
           </a:p>
@@ -1865,7 +1865,7 @@
           <a:p>
             <a:fld id="{96DFF08F-DC6B-4601-B491-B0F83F6DD2DA}" type="datetimeFigureOut">
               <a:rPr lang="en-US" smtClean="0"/>
-              <a:t>3/7/2013</a:t>
+              <a:t>4/6/2013</a:t>
             </a:fld>
             <a:endParaRPr lang="en-US" dirty="0"/>
           </a:p>
@@ -2006,7 +2006,7 @@
           <a:p>
             <a:fld id="{96DFF08F-DC6B-4601-B491-B0F83F6DD2DA}" type="datetimeFigureOut">
               <a:rPr lang="en-US" smtClean="0"/>
-              <a:t>3/7/2013</a:t>
+              <a:t>4/6/2013</a:t>
             </a:fld>
             <a:endParaRPr lang="en-US"/>
           </a:p>
@@ -2101,7 +2101,7 @@
           <a:p>
             <a:fld id="{96DFF08F-DC6B-4601-B491-B0F83F6DD2DA}" type="datetimeFigureOut">
               <a:rPr lang="en-US" smtClean="0"/>
-              <a:t>3/7/2013</a:t>
+              <a:t>4/6/2013</a:t>
             </a:fld>
             <a:endParaRPr lang="en-US"/>
           </a:p>
@@ -2354,7 +2354,7 @@
           <a:p>
             <a:fld id="{96DFF08F-DC6B-4601-B491-B0F83F6DD2DA}" type="datetimeFigureOut">
               <a:rPr lang="en-US" smtClean="0"/>
-              <a:t>3/7/2013</a:t>
+              <a:t>4/6/2013</a:t>
             </a:fld>
             <a:endParaRPr lang="en-US"/>
           </a:p>
@@ -2678,7 +2678,7 @@
           <a:p>
             <a:fld id="{96DFF08F-DC6B-4601-B491-B0F83F6DD2DA}" type="datetimeFigureOut">
               <a:rPr lang="en-US" smtClean="0"/>
-              <a:t>3/7/2013</a:t>
+              <a:t>4/6/2013</a:t>
             </a:fld>
             <a:endParaRPr lang="en-US" dirty="0"/>
           </a:p>
@@ -2929,7 +2929,7 @@
             <a:fld id="{96DFF08F-DC6B-4601-B491-B0F83F6DD2DA}" type="datetimeFigureOut">
               <a:rPr lang="en-US" smtClean="0"/>
               <a:pPr/>
-              <a:t>3/7/2013</a:t>
+              <a:t>4/6/2013</a:t>
             </a:fld>
             <a:endParaRPr lang="en-US" dirty="0"/>
           </a:p>
@@ -3614,8 +3614,41 @@
             </a:r>
             <a:r>
               <a:rPr lang="en-US" dirty="0"/>
-              <a:t>edge cases, easier to read and maintain, minimized bookkeeping code);</a:t>
-            </a:r>
+              <a:t>edge cases, easier to read and maintain, minimized bookkeeping code</a:t>
+            </a:r>
+            <a:r>
+              <a:rPr lang="en-US" dirty="0"/>
+              <a:t>) (</a:t>
+            </a:r>
+            <a:r>
+              <a:rPr lang="en-US" dirty="0" smtClean="0"/>
+              <a:t>see </a:t>
+            </a:r>
+            <a:r>
+              <a:rPr lang="en-US" dirty="0" smtClean="0">
+                <a:hlinkClick r:id="rId2"/>
+              </a:rPr>
+              <a:t>this</a:t>
+            </a:r>
+            <a:r>
+              <a:rPr lang="en-US" dirty="0" smtClean="0"/>
+              <a:t> </a:t>
+            </a:r>
+            <a:r>
+              <a:rPr lang="en-US" dirty="0"/>
+              <a:t>and </a:t>
+            </a:r>
+            <a:r>
+              <a:rPr lang="en-US" dirty="0" smtClean="0">
+                <a:hlinkClick r:id="rId3"/>
+              </a:rPr>
+              <a:t>this</a:t>
+            </a:r>
+            <a:r>
+              <a:rPr lang="en-US" dirty="0" smtClean="0"/>
+              <a:t>);</a:t>
+            </a:r>
+            <a:endParaRPr lang="en-US" dirty="0"/>
           </a:p>
           <a:p>
             <a:pPr marL="342900" indent="-342900">
@@ -4281,7 +4314,7 @@
               <a:buChar char="•"/>
             </a:pPr>
             <a:r>
-              <a:rPr lang="en-US" smtClean="0"/>
+              <a:rPr lang="en-US" dirty="0" err="1" smtClean="0"/>
               <a:t>FPish</a:t>
             </a:r>
             <a:r>

</xml_diff>